<commit_message>
added to gpu pptx as prep for interview and help with gpu architechture
</commit_message>
<xml_diff>
--- a/Parallel Computing of QUEST and TRIAD with GPUs.pptx
+++ b/Parallel Computing of QUEST and TRIAD with GPUs.pptx
@@ -119,6 +119,11 @@
       </a:defRPr>
     </a:lvl9pPr>
   </p:defaultTextStyle>
+  <p:extLst>
+    <p:ext uri="{EFAFB233-063F-42B5-8137-9DF3F51BA10A}">
+      <p15:sldGuideLst xmlns:p15="http://schemas.microsoft.com/office/powerpoint/2012/main"/>
+    </p:ext>
+  </p:extLst>
 </p:presentation>
 </file>
 
@@ -269,7 +274,7 @@
           <a:p>
             <a:fld id="{B0C3F5C3-5CC2-471A-BD56-129AF53A2B18}" type="datetimeFigureOut">
               <a:rPr lang="en-US" smtClean="0"/>
-              <a:t>4/20/2022</a:t>
+              <a:t>4/22/2022</a:t>
             </a:fld>
             <a:endParaRPr lang="en-US"/>
           </a:p>
@@ -467,7 +472,7 @@
           <a:p>
             <a:fld id="{B0C3F5C3-5CC2-471A-BD56-129AF53A2B18}" type="datetimeFigureOut">
               <a:rPr lang="en-US" smtClean="0"/>
-              <a:t>4/20/2022</a:t>
+              <a:t>4/22/2022</a:t>
             </a:fld>
             <a:endParaRPr lang="en-US"/>
           </a:p>
@@ -675,7 +680,7 @@
           <a:p>
             <a:fld id="{B0C3F5C3-5CC2-471A-BD56-129AF53A2B18}" type="datetimeFigureOut">
               <a:rPr lang="en-US" smtClean="0"/>
-              <a:t>4/20/2022</a:t>
+              <a:t>4/22/2022</a:t>
             </a:fld>
             <a:endParaRPr lang="en-US"/>
           </a:p>
@@ -873,7 +878,7 @@
           <a:p>
             <a:fld id="{B0C3F5C3-5CC2-471A-BD56-129AF53A2B18}" type="datetimeFigureOut">
               <a:rPr lang="en-US" smtClean="0"/>
-              <a:t>4/20/2022</a:t>
+              <a:t>4/22/2022</a:t>
             </a:fld>
             <a:endParaRPr lang="en-US"/>
           </a:p>
@@ -1148,7 +1153,7 @@
           <a:p>
             <a:fld id="{B0C3F5C3-5CC2-471A-BD56-129AF53A2B18}" type="datetimeFigureOut">
               <a:rPr lang="en-US" smtClean="0"/>
-              <a:t>4/20/2022</a:t>
+              <a:t>4/22/2022</a:t>
             </a:fld>
             <a:endParaRPr lang="en-US"/>
           </a:p>
@@ -1413,7 +1418,7 @@
           <a:p>
             <a:fld id="{B0C3F5C3-5CC2-471A-BD56-129AF53A2B18}" type="datetimeFigureOut">
               <a:rPr lang="en-US" smtClean="0"/>
-              <a:t>4/20/2022</a:t>
+              <a:t>4/22/2022</a:t>
             </a:fld>
             <a:endParaRPr lang="en-US"/>
           </a:p>
@@ -1825,7 +1830,7 @@
           <a:p>
             <a:fld id="{B0C3F5C3-5CC2-471A-BD56-129AF53A2B18}" type="datetimeFigureOut">
               <a:rPr lang="en-US" smtClean="0"/>
-              <a:t>4/20/2022</a:t>
+              <a:t>4/22/2022</a:t>
             </a:fld>
             <a:endParaRPr lang="en-US"/>
           </a:p>
@@ -1966,7 +1971,7 @@
           <a:p>
             <a:fld id="{B0C3F5C3-5CC2-471A-BD56-129AF53A2B18}" type="datetimeFigureOut">
               <a:rPr lang="en-US" smtClean="0"/>
-              <a:t>4/20/2022</a:t>
+              <a:t>4/22/2022</a:t>
             </a:fld>
             <a:endParaRPr lang="en-US"/>
           </a:p>
@@ -2079,7 +2084,7 @@
           <a:p>
             <a:fld id="{B0C3F5C3-5CC2-471A-BD56-129AF53A2B18}" type="datetimeFigureOut">
               <a:rPr lang="en-US" smtClean="0"/>
-              <a:t>4/20/2022</a:t>
+              <a:t>4/22/2022</a:t>
             </a:fld>
             <a:endParaRPr lang="en-US"/>
           </a:p>
@@ -2390,7 +2395,7 @@
           <a:p>
             <a:fld id="{B0C3F5C3-5CC2-471A-BD56-129AF53A2B18}" type="datetimeFigureOut">
               <a:rPr lang="en-US" smtClean="0"/>
-              <a:t>4/20/2022</a:t>
+              <a:t>4/22/2022</a:t>
             </a:fld>
             <a:endParaRPr lang="en-US"/>
           </a:p>
@@ -2678,7 +2683,7 @@
           <a:p>
             <a:fld id="{B0C3F5C3-5CC2-471A-BD56-129AF53A2B18}" type="datetimeFigureOut">
               <a:rPr lang="en-US" smtClean="0"/>
-              <a:t>4/20/2022</a:t>
+              <a:t>4/22/2022</a:t>
             </a:fld>
             <a:endParaRPr lang="en-US"/>
           </a:p>
@@ -2919,7 +2924,7 @@
           <a:p>
             <a:fld id="{B0C3F5C3-5CC2-471A-BD56-129AF53A2B18}" type="datetimeFigureOut">
               <a:rPr lang="en-US" smtClean="0"/>
-              <a:t>4/20/2022</a:t>
+              <a:t>4/22/2022</a:t>
             </a:fld>
             <a:endParaRPr lang="en-US"/>
           </a:p>
@@ -4119,8 +4124,26 @@
           <a:p>
             <a:r>
               <a:rPr lang="en-US" dirty="0"/>
-              <a:t>Attitude computation is fast, can we make it faster</a:t>
-            </a:r>
+              <a:t>Attitude computation is fast, can we make it faster?</a:t>
+            </a:r>
+          </a:p>
+          <a:p>
+            <a:r>
+              <a:rPr lang="en-US" dirty="0"/>
+              <a:t>Common numerical bottlenecks for scientific computing</a:t>
+            </a:r>
+          </a:p>
+          <a:p>
+            <a:pPr lvl="1"/>
+            <a:r>
+              <a:rPr lang="en-US"/>
+              <a:t>Sequential algorithms</a:t>
+            </a:r>
+            <a:endParaRPr lang="en-US" dirty="0"/>
+          </a:p>
+          <a:p>
+            <a:pPr lvl="1"/>
+            <a:endParaRPr lang="en-US" dirty="0"/>
           </a:p>
         </p:txBody>
       </p:sp>
@@ -4177,7 +4200,7 @@
           <a:p>
             <a:r>
               <a:rPr lang="en-US" dirty="0"/>
-              <a:t>Differences between computations in a GPU and CPU</a:t>
+              <a:t>Traditional computations and their execution	</a:t>
             </a:r>
           </a:p>
         </p:txBody>
@@ -4260,7 +4283,7 @@
           <a:p>
             <a:r>
               <a:rPr lang="en-US" dirty="0"/>
-              <a:t>What are GPUs</a:t>
+              <a:t>What are GPUs?</a:t>
             </a:r>
           </a:p>
         </p:txBody>
@@ -4286,7 +4309,13 @@
           <a:bodyPr/>
           <a:lstStyle/>
           <a:p>
-            <a:endParaRPr lang="en-US"/>
+            <a:r>
+              <a:rPr lang="en-US" dirty="0"/>
+              <a:t>GPUs are specialized electronic circuits designed for quickly rendering images for output to a display</a:t>
+            </a:r>
+          </a:p>
+          <a:p>
+            <a:endParaRPr lang="en-US" dirty="0"/>
           </a:p>
         </p:txBody>
       </p:sp>

</xml_diff>